<commit_message>
changes to the final paper
Finally. Please review
</commit_message>
<xml_diff>
--- a/final/Presentation.pptx
+++ b/final/Presentation.pptx
@@ -2878,7 +2878,8 @@
           <a:p>
             <a:fld id="{B333081E-CB5B-4882-B306-CC37CE1A7762}" type="datetimeFigureOut">
               <a:rPr lang="en-US" smtClean="0"/>
-              <a:t>4/23/2013</a:t>
+              <a:pPr/>
+              <a:t>4/26/2013</a:t>
             </a:fld>
             <a:endParaRPr lang="en-US" dirty="0"/>
           </a:p>
@@ -2994,6 +2995,7 @@
           <a:p>
             <a:fld id="{58DCAC28-0EF7-419D-B8AA-D3671161EEFB}" type="slidenum">
               <a:rPr lang="en-US" smtClean="0"/>
+              <a:pPr/>
               <a:t>‹#›</a:t>
             </a:fld>
             <a:endParaRPr lang="en-US" dirty="0"/>
@@ -3163,7 +3165,8 @@
           <a:p>
             <a:fld id="{B333081E-CB5B-4882-B306-CC37CE1A7762}" type="datetimeFigureOut">
               <a:rPr lang="en-US" smtClean="0"/>
-              <a:t>4/23/2013</a:t>
+              <a:pPr/>
+              <a:t>4/26/2013</a:t>
             </a:fld>
             <a:endParaRPr lang="en-US" dirty="0"/>
           </a:p>
@@ -3205,6 +3208,7 @@
           <a:p>
             <a:fld id="{58DCAC28-0EF7-419D-B8AA-D3671161EEFB}" type="slidenum">
               <a:rPr lang="en-US" smtClean="0"/>
+              <a:pPr/>
               <a:t>‹#›</a:t>
             </a:fld>
             <a:endParaRPr lang="en-US" dirty="0"/>
@@ -3338,7 +3342,8 @@
           <a:p>
             <a:fld id="{B333081E-CB5B-4882-B306-CC37CE1A7762}" type="datetimeFigureOut">
               <a:rPr lang="en-US" smtClean="0"/>
-              <a:t>4/23/2013</a:t>
+              <a:pPr/>
+              <a:t>4/26/2013</a:t>
             </a:fld>
             <a:endParaRPr lang="en-US" dirty="0"/>
           </a:p>
@@ -3380,6 +3385,7 @@
           <a:p>
             <a:fld id="{58DCAC28-0EF7-419D-B8AA-D3671161EEFB}" type="slidenum">
               <a:rPr lang="en-US" smtClean="0"/>
+              <a:pPr/>
               <a:t>‹#›</a:t>
             </a:fld>
             <a:endParaRPr lang="en-US" dirty="0"/>
@@ -3503,7 +3509,8 @@
           <a:p>
             <a:fld id="{B333081E-CB5B-4882-B306-CC37CE1A7762}" type="datetimeFigureOut">
               <a:rPr lang="en-US" smtClean="0"/>
-              <a:t>4/23/2013</a:t>
+              <a:pPr/>
+              <a:t>4/26/2013</a:t>
             </a:fld>
             <a:endParaRPr lang="en-US" dirty="0"/>
           </a:p>
@@ -3545,6 +3552,7 @@
           <a:p>
             <a:fld id="{58DCAC28-0EF7-419D-B8AA-D3671161EEFB}" type="slidenum">
               <a:rPr lang="en-US" smtClean="0"/>
+              <a:pPr/>
               <a:t>‹#›</a:t>
             </a:fld>
             <a:endParaRPr lang="en-US" dirty="0"/>
@@ -3744,7 +3752,8 @@
           <a:p>
             <a:fld id="{B333081E-CB5B-4882-B306-CC37CE1A7762}" type="datetimeFigureOut">
               <a:rPr lang="en-US" smtClean="0"/>
-              <a:t>4/23/2013</a:t>
+              <a:pPr/>
+              <a:t>4/26/2013</a:t>
             </a:fld>
             <a:endParaRPr lang="en-US" dirty="0"/>
           </a:p>
@@ -3786,6 +3795,7 @@
           <a:p>
             <a:fld id="{58DCAC28-0EF7-419D-B8AA-D3671161EEFB}" type="slidenum">
               <a:rPr lang="en-US" smtClean="0"/>
+              <a:pPr/>
               <a:t>‹#›</a:t>
             </a:fld>
             <a:endParaRPr lang="en-US" dirty="0"/>
@@ -3857,7 +3867,8 @@
           <a:p>
             <a:fld id="{B333081E-CB5B-4882-B306-CC37CE1A7762}" type="datetimeFigureOut">
               <a:rPr lang="en-US" smtClean="0"/>
-              <a:t>4/23/2013</a:t>
+              <a:pPr/>
+              <a:t>4/26/2013</a:t>
             </a:fld>
             <a:endParaRPr lang="en-US" dirty="0"/>
           </a:p>
@@ -3899,6 +3910,7 @@
           <a:p>
             <a:fld id="{58DCAC28-0EF7-419D-B8AA-D3671161EEFB}" type="slidenum">
               <a:rPr lang="en-US" smtClean="0"/>
+              <a:pPr/>
               <a:t>‹#›</a:t>
             </a:fld>
             <a:endParaRPr lang="en-US" dirty="0"/>
@@ -4396,7 +4408,8 @@
           <a:p>
             <a:fld id="{B333081E-CB5B-4882-B306-CC37CE1A7762}" type="datetimeFigureOut">
               <a:rPr lang="en-US" smtClean="0"/>
-              <a:t>4/23/2013</a:t>
+              <a:pPr/>
+              <a:t>4/26/2013</a:t>
             </a:fld>
             <a:endParaRPr lang="en-US" dirty="0"/>
           </a:p>
@@ -4438,6 +4451,7 @@
           <a:p>
             <a:fld id="{58DCAC28-0EF7-419D-B8AA-D3671161EEFB}" type="slidenum">
               <a:rPr lang="en-US" smtClean="0"/>
+              <a:pPr/>
               <a:t>‹#›</a:t>
             </a:fld>
             <a:endParaRPr lang="en-US" dirty="0"/>
@@ -4509,7 +4523,8 @@
           <a:p>
             <a:fld id="{B333081E-CB5B-4882-B306-CC37CE1A7762}" type="datetimeFigureOut">
               <a:rPr lang="en-US" smtClean="0"/>
-              <a:t>4/23/2013</a:t>
+              <a:pPr/>
+              <a:t>4/26/2013</a:t>
             </a:fld>
             <a:endParaRPr lang="en-US" dirty="0"/>
           </a:p>
@@ -4551,6 +4566,7 @@
           <a:p>
             <a:fld id="{58DCAC28-0EF7-419D-B8AA-D3671161EEFB}" type="slidenum">
               <a:rPr lang="en-US" smtClean="0"/>
+              <a:pPr/>
               <a:t>‹#›</a:t>
             </a:fld>
             <a:endParaRPr lang="en-US" dirty="0"/>
@@ -4599,7 +4615,8 @@
           <a:p>
             <a:fld id="{B333081E-CB5B-4882-B306-CC37CE1A7762}" type="datetimeFigureOut">
               <a:rPr lang="en-US" smtClean="0"/>
-              <a:t>4/23/2013</a:t>
+              <a:pPr/>
+              <a:t>4/26/2013</a:t>
             </a:fld>
             <a:endParaRPr lang="en-US" dirty="0"/>
           </a:p>
@@ -4641,6 +4658,7 @@
           <a:p>
             <a:fld id="{58DCAC28-0EF7-419D-B8AA-D3671161EEFB}" type="slidenum">
               <a:rPr lang="en-US" smtClean="0"/>
+              <a:pPr/>
               <a:t>‹#›</a:t>
             </a:fld>
             <a:endParaRPr lang="en-US" dirty="0"/>
@@ -7250,7 +7268,8 @@
           <a:p>
             <a:fld id="{B333081E-CB5B-4882-B306-CC37CE1A7762}" type="datetimeFigureOut">
               <a:rPr lang="en-US" smtClean="0"/>
-              <a:t>4/23/2013</a:t>
+              <a:pPr/>
+              <a:t>4/26/2013</a:t>
             </a:fld>
             <a:endParaRPr lang="en-US" dirty="0"/>
           </a:p>
@@ -7273,6 +7292,7 @@
           <a:p>
             <a:fld id="{58DCAC28-0EF7-419D-B8AA-D3671161EEFB}" type="slidenum">
               <a:rPr lang="en-US" smtClean="0"/>
+              <a:pPr/>
               <a:t>‹#›</a:t>
             </a:fld>
             <a:endParaRPr lang="en-US" dirty="0"/>
@@ -10462,7 +10482,8 @@
           <a:p>
             <a:fld id="{B333081E-CB5B-4882-B306-CC37CE1A7762}" type="datetimeFigureOut">
               <a:rPr lang="en-US" smtClean="0"/>
-              <a:t>4/23/2013</a:t>
+              <a:pPr/>
+              <a:t>4/26/2013</a:t>
             </a:fld>
             <a:endParaRPr lang="en-US" dirty="0"/>
           </a:p>
@@ -10511,6 +10532,7 @@
           <a:p>
             <a:fld id="{58DCAC28-0EF7-419D-B8AA-D3671161EEFB}" type="slidenum">
               <a:rPr lang="en-US" smtClean="0"/>
+              <a:pPr/>
               <a:t>‹#›</a:t>
             </a:fld>
             <a:endParaRPr lang="en-US" dirty="0"/>
@@ -13284,7 +13306,8 @@
           <a:p>
             <a:fld id="{B333081E-CB5B-4882-B306-CC37CE1A7762}" type="datetimeFigureOut">
               <a:rPr lang="en-US" smtClean="0"/>
-              <a:t>4/23/2013</a:t>
+              <a:pPr/>
+              <a:t>4/26/2013</a:t>
             </a:fld>
             <a:endParaRPr lang="en-US" dirty="0"/>
           </a:p>
@@ -13358,6 +13381,7 @@
           <a:p>
             <a:fld id="{58DCAC28-0EF7-419D-B8AA-D3671161EEFB}" type="slidenum">
               <a:rPr lang="en-US" smtClean="0"/>
+              <a:pPr/>
               <a:t>‹#›</a:t>
             </a:fld>
             <a:endParaRPr lang="en-US" dirty="0"/>
@@ -13828,7 +13852,7 @@
     </p:spTree>
     <p:extLst>
       <p:ext uri="{BB962C8B-B14F-4D97-AF65-F5344CB8AC3E}">
-        <p14:creationId xmlns:p14="http://schemas.microsoft.com/office/powerpoint/2010/main" val="666355475"/>
+        <p14:creationId xmlns:p14="http://schemas.microsoft.com/office/powerpoint/2010/main" xmlns="" val="666355475"/>
       </p:ext>
     </p:extLst>
   </p:cSld>
@@ -13903,10 +13927,10 @@
           </p:nvPr>
         </p:nvPicPr>
         <p:blipFill>
-          <a:blip r:embed="rId2">
+          <a:blip r:embed="rId2" cstate="print">
             <a:extLst>
               <a:ext uri="{28A0092B-C50C-407E-A947-70E740481C1C}">
-                <a14:useLocalDpi xmlns:a14="http://schemas.microsoft.com/office/drawing/2010/main" val="0"/>
+                <a14:useLocalDpi xmlns:a14="http://schemas.microsoft.com/office/drawing/2010/main" xmlns="" val="0"/>
               </a:ext>
             </a:extLst>
           </a:blip>
@@ -13954,7 +13978,7 @@
     </p:spTree>
     <p:extLst>
       <p:ext uri="{BB962C8B-B14F-4D97-AF65-F5344CB8AC3E}">
-        <p14:creationId xmlns:p14="http://schemas.microsoft.com/office/powerpoint/2010/main" val="3699659208"/>
+        <p14:creationId xmlns:p14="http://schemas.microsoft.com/office/powerpoint/2010/main" xmlns="" val="3699659208"/>
       </p:ext>
     </p:extLst>
   </p:cSld>
@@ -14029,10 +14053,10 @@
           </p:nvPr>
         </p:nvPicPr>
         <p:blipFill>
-          <a:blip r:embed="rId2">
+          <a:blip r:embed="rId2" cstate="print">
             <a:extLst>
               <a:ext uri="{28A0092B-C50C-407E-A947-70E740481C1C}">
-                <a14:useLocalDpi xmlns:a14="http://schemas.microsoft.com/office/drawing/2010/main" val="0"/>
+                <a14:useLocalDpi xmlns:a14="http://schemas.microsoft.com/office/drawing/2010/main" xmlns="" val="0"/>
               </a:ext>
             </a:extLst>
           </a:blip>
@@ -14080,7 +14104,7 @@
     </p:spTree>
     <p:extLst>
       <p:ext uri="{BB962C8B-B14F-4D97-AF65-F5344CB8AC3E}">
-        <p14:creationId xmlns:p14="http://schemas.microsoft.com/office/powerpoint/2010/main" val="2213963016"/>
+        <p14:creationId xmlns:p14="http://schemas.microsoft.com/office/powerpoint/2010/main" xmlns="" val="2213963016"/>
       </p:ext>
     </p:extLst>
   </p:cSld>
@@ -14185,10 +14209,10 @@
           </p:nvPr>
         </p:nvPicPr>
         <p:blipFill>
-          <a:blip r:embed="rId2">
+          <a:blip r:embed="rId2" cstate="print">
             <a:extLst>
               <a:ext uri="{28A0092B-C50C-407E-A947-70E740481C1C}">
-                <a14:useLocalDpi xmlns:a14="http://schemas.microsoft.com/office/drawing/2010/main" val="0"/>
+                <a14:useLocalDpi xmlns:a14="http://schemas.microsoft.com/office/drawing/2010/main" xmlns="" val="0"/>
               </a:ext>
             </a:extLst>
           </a:blip>
@@ -14206,7 +14230,7 @@
     </p:spTree>
     <p:extLst>
       <p:ext uri="{BB962C8B-B14F-4D97-AF65-F5344CB8AC3E}">
-        <p14:creationId xmlns:p14="http://schemas.microsoft.com/office/powerpoint/2010/main" val="597527647"/>
+        <p14:creationId xmlns:p14="http://schemas.microsoft.com/office/powerpoint/2010/main" xmlns="" val="597527647"/>
       </p:ext>
     </p:extLst>
   </p:cSld>
@@ -14350,7 +14374,7 @@
     </p:spTree>
     <p:extLst>
       <p:ext uri="{BB962C8B-B14F-4D97-AF65-F5344CB8AC3E}">
-        <p14:creationId xmlns:p14="http://schemas.microsoft.com/office/powerpoint/2010/main" val="14587613"/>
+        <p14:creationId xmlns:p14="http://schemas.microsoft.com/office/powerpoint/2010/main" xmlns="" val="14587613"/>
       </p:ext>
     </p:extLst>
   </p:cSld>
@@ -14426,7 +14450,6 @@
               <a:rPr lang="en-US" dirty="0" smtClean="0"/>
               <a:t>Future Work</a:t>
             </a:r>
-            <a:endParaRPr lang="en-US" dirty="0" smtClean="0"/>
           </a:p>
           <a:p>
             <a:pPr lvl="1"/>
@@ -14446,11 +14469,7 @@
             <a:pPr lvl="1"/>
             <a:r>
               <a:rPr lang="en-US" dirty="0" smtClean="0"/>
-              <a:t>Haptic </a:t>
-            </a:r>
-            <a:r>
-              <a:rPr lang="en-US" dirty="0" smtClean="0"/>
-              <a:t>Feedback</a:t>
+              <a:t>Haptic Feedback</a:t>
             </a:r>
           </a:p>
           <a:p>
@@ -14459,7 +14478,6 @@
               <a:rPr lang="en-US" dirty="0" smtClean="0"/>
               <a:t>Import/Export/Save/Load</a:t>
             </a:r>
-            <a:endParaRPr lang="en-US" dirty="0" smtClean="0"/>
           </a:p>
           <a:p>
             <a:pPr lvl="1"/>
@@ -14486,7 +14504,7 @@
     </p:spTree>
     <p:extLst>
       <p:ext uri="{BB962C8B-B14F-4D97-AF65-F5344CB8AC3E}">
-        <p14:creationId xmlns:p14="http://schemas.microsoft.com/office/powerpoint/2010/main" val="1200128816"/>
+        <p14:creationId xmlns:p14="http://schemas.microsoft.com/office/powerpoint/2010/main" xmlns="" val="1200128816"/>
       </p:ext>
     </p:extLst>
   </p:cSld>
@@ -14590,7 +14608,7 @@
     </p:spTree>
     <p:extLst>
       <p:ext uri="{BB962C8B-B14F-4D97-AF65-F5344CB8AC3E}">
-        <p14:creationId xmlns:p14="http://schemas.microsoft.com/office/powerpoint/2010/main" val="435183730"/>
+        <p14:creationId xmlns:p14="http://schemas.microsoft.com/office/powerpoint/2010/main" xmlns="" val="435183730"/>
       </p:ext>
     </p:extLst>
   </p:cSld>
@@ -14707,11 +14725,7 @@
             <a:pPr lvl="1"/>
             <a:r>
               <a:rPr lang="en-US" dirty="0" smtClean="0"/>
-              <a:t>Intuitive, easy to use </a:t>
-            </a:r>
-            <a:r>
-              <a:rPr lang="en-US" dirty="0" smtClean="0"/>
-              <a:t>interface</a:t>
+              <a:t>Intuitive, easy to use interface</a:t>
             </a:r>
           </a:p>
           <a:p>
@@ -14726,14 +14740,13 @@
               <a:rPr lang="en-US" dirty="0" smtClean="0"/>
               <a:t>Intended for single object manipulation and viewer</a:t>
             </a:r>
-            <a:endParaRPr lang="en-US" dirty="0" smtClean="0"/>
           </a:p>
         </p:txBody>
       </p:sp>
     </p:spTree>
     <p:extLst>
       <p:ext uri="{BB962C8B-B14F-4D97-AF65-F5344CB8AC3E}">
-        <p14:creationId xmlns:p14="http://schemas.microsoft.com/office/powerpoint/2010/main" val="429522322"/>
+        <p14:creationId xmlns:p14="http://schemas.microsoft.com/office/powerpoint/2010/main" xmlns="" val="429522322"/>
       </p:ext>
     </p:extLst>
   </p:cSld>
@@ -14807,17 +14820,52 @@
           <a:p>
             <a:r>
               <a:rPr lang="en-US" dirty="0" smtClean="0"/>
-              <a:t>Menu pop up</a:t>
-            </a:r>
-          </a:p>
-          <a:p>
+              <a:t>Menu </a:t>
+            </a:r>
             <a:r>
               <a:rPr lang="en-US" dirty="0" smtClean="0"/>
-              <a:t>Bimanual interaction</a:t>
-            </a:r>
-          </a:p>
-          <a:p>
-            <a:pPr lvl="1"/>
+              <a:t>display (software interface)</a:t>
+            </a:r>
+            <a:endParaRPr lang="en-US" dirty="0" smtClean="0"/>
+          </a:p>
+          <a:p>
+            <a:r>
+              <a:rPr lang="en-US" dirty="0" smtClean="0"/>
+              <a:t>Method of interaction with the system (</a:t>
+            </a:r>
+            <a:r>
+              <a:rPr lang="en-US" dirty="0" err="1" smtClean="0"/>
+              <a:t>Wii</a:t>
+            </a:r>
+            <a:r>
+              <a:rPr lang="en-US" dirty="0" smtClean="0"/>
+              <a:t> remotes)</a:t>
+            </a:r>
+          </a:p>
+          <a:p>
+            <a:r>
+              <a:rPr lang="en-US" dirty="0" smtClean="0"/>
+              <a:t>Number of manipulation allowed on </a:t>
+            </a:r>
+            <a:r>
+              <a:rPr lang="en-US" dirty="0" smtClean="0"/>
+              <a:t>an object (</a:t>
+            </a:r>
+            <a:r>
+              <a:rPr lang="en-US" dirty="0" smtClean="0"/>
+              <a:t>low level </a:t>
+            </a:r>
+            <a:r>
+              <a:rPr lang="en-US" dirty="0" smtClean="0"/>
+              <a:t>correction and </a:t>
+            </a:r>
+            <a:r>
+              <a:rPr lang="en-US" dirty="0" smtClean="0"/>
+              <a:t>revision)</a:t>
+            </a:r>
+            <a:endParaRPr lang="en-US" dirty="0" smtClean="0"/>
+          </a:p>
+          <a:p>
             <a:r>
               <a:rPr lang="en-US" dirty="0" smtClean="0"/>
               <a:t>Scale the </a:t>
@@ -14825,6 +14873,12 @@
             <a:r>
               <a:rPr lang="en-US" dirty="0" smtClean="0"/>
               <a:t>world</a:t>
+            </a:r>
+          </a:p>
+          <a:p>
+            <a:r>
+              <a:rPr lang="en-US" smtClean="0"/>
+              <a:t>Bird-eye view</a:t>
             </a:r>
             <a:endParaRPr lang="en-US" dirty="0" smtClean="0"/>
           </a:p>
@@ -14836,7 +14890,7 @@
     </p:spTree>
     <p:extLst>
       <p:ext uri="{BB962C8B-B14F-4D97-AF65-F5344CB8AC3E}">
-        <p14:creationId xmlns:p14="http://schemas.microsoft.com/office/powerpoint/2010/main" val="193691291"/>
+        <p14:creationId xmlns:p14="http://schemas.microsoft.com/office/powerpoint/2010/main" xmlns="" val="193691291"/>
       </p:ext>
     </p:extLst>
   </p:cSld>
@@ -14942,7 +14996,7 @@
     </p:spTree>
     <p:extLst>
       <p:ext uri="{BB962C8B-B14F-4D97-AF65-F5344CB8AC3E}">
-        <p14:creationId xmlns:p14="http://schemas.microsoft.com/office/powerpoint/2010/main" val="1634110124"/>
+        <p14:creationId xmlns:p14="http://schemas.microsoft.com/office/powerpoint/2010/main" xmlns="" val="1634110124"/>
       </p:ext>
     </p:extLst>
   </p:cSld>
@@ -15062,7 +15116,7 @@
     </p:spTree>
     <p:extLst>
       <p:ext uri="{BB962C8B-B14F-4D97-AF65-F5344CB8AC3E}">
-        <p14:creationId xmlns:p14="http://schemas.microsoft.com/office/powerpoint/2010/main" val="2771204190"/>
+        <p14:creationId xmlns:p14="http://schemas.microsoft.com/office/powerpoint/2010/main" xmlns="" val="2771204190"/>
       </p:ext>
     </p:extLst>
   </p:cSld>
@@ -15210,7 +15264,7 @@
     </p:spTree>
     <p:extLst>
       <p:ext uri="{BB962C8B-B14F-4D97-AF65-F5344CB8AC3E}">
-        <p14:creationId xmlns:p14="http://schemas.microsoft.com/office/powerpoint/2010/main" val="3358130738"/>
+        <p14:creationId xmlns:p14="http://schemas.microsoft.com/office/powerpoint/2010/main" xmlns="" val="3358130738"/>
       </p:ext>
     </p:extLst>
   </p:cSld>
@@ -15314,7 +15368,7 @@
     </p:spTree>
     <p:extLst>
       <p:ext uri="{BB962C8B-B14F-4D97-AF65-F5344CB8AC3E}">
-        <p14:creationId xmlns:p14="http://schemas.microsoft.com/office/powerpoint/2010/main" val="945286241"/>
+        <p14:creationId xmlns:p14="http://schemas.microsoft.com/office/powerpoint/2010/main" xmlns="" val="945286241"/>
       </p:ext>
     </p:extLst>
   </p:cSld>
@@ -15439,21 +15493,8 @@
             <a:pPr lvl="1"/>
             <a:r>
               <a:rPr lang="en-US" dirty="0" smtClean="0"/>
-              <a:t>File menu for </a:t>
-            </a:r>
-            <a:r>
-              <a:rPr lang="en-US" dirty="0" smtClean="0"/>
-              <a:t>saving/loading </a:t>
-            </a:r>
-            <a:r>
-              <a:rPr lang="en-US" dirty="0" smtClean="0"/>
-              <a:t>and </a:t>
-            </a:r>
-            <a:r>
-              <a:rPr lang="en-US" dirty="0" smtClean="0"/>
-              <a:t>exporting/importing</a:t>
-            </a:r>
-            <a:endParaRPr lang="en-US" dirty="0" smtClean="0"/>
+              <a:t>File menu for saving/loading and exporting/importing</a:t>
+            </a:r>
           </a:p>
           <a:p>
             <a:r>
@@ -15490,7 +15531,7 @@
     </p:spTree>
     <p:extLst>
       <p:ext uri="{BB962C8B-B14F-4D97-AF65-F5344CB8AC3E}">
-        <p14:creationId xmlns:p14="http://schemas.microsoft.com/office/powerpoint/2010/main" val="3205191440"/>
+        <p14:creationId xmlns:p14="http://schemas.microsoft.com/office/powerpoint/2010/main" xmlns="" val="3205191440"/>
       </p:ext>
     </p:extLst>
   </p:cSld>
@@ -15565,10 +15606,10 @@
           </p:nvPr>
         </p:nvPicPr>
         <p:blipFill>
-          <a:blip r:embed="rId2">
+          <a:blip r:embed="rId2" cstate="print">
             <a:extLst>
               <a:ext uri="{28A0092B-C50C-407E-A947-70E740481C1C}">
-                <a14:useLocalDpi xmlns:a14="http://schemas.microsoft.com/office/drawing/2010/main" val="0"/>
+                <a14:useLocalDpi xmlns:a14="http://schemas.microsoft.com/office/drawing/2010/main" xmlns="" val="0"/>
               </a:ext>
             </a:extLst>
           </a:blip>
@@ -15616,7 +15657,7 @@
     </p:spTree>
     <p:extLst>
       <p:ext uri="{BB962C8B-B14F-4D97-AF65-F5344CB8AC3E}">
-        <p14:creationId xmlns:p14="http://schemas.microsoft.com/office/powerpoint/2010/main" val="2917243991"/>
+        <p14:creationId xmlns:p14="http://schemas.microsoft.com/office/powerpoint/2010/main" xmlns="" val="2917243991"/>
       </p:ext>
     </p:extLst>
   </p:cSld>

</xml_diff>

<commit_message>
Modify presentation and paper
</commit_message>
<xml_diff>
--- a/final/Presentation.pptx
+++ b/final/Presentation.pptx
@@ -2879,7 +2879,7 @@
             <a:fld id="{B333081E-CB5B-4882-B306-CC37CE1A7762}" type="datetimeFigureOut">
               <a:rPr lang="en-US" smtClean="0"/>
               <a:pPr/>
-              <a:t>4/26/2013</a:t>
+              <a:t>4/27/2013</a:t>
             </a:fld>
             <a:endParaRPr lang="en-US" dirty="0"/>
           </a:p>
@@ -3166,7 +3166,7 @@
             <a:fld id="{B333081E-CB5B-4882-B306-CC37CE1A7762}" type="datetimeFigureOut">
               <a:rPr lang="en-US" smtClean="0"/>
               <a:pPr/>
-              <a:t>4/26/2013</a:t>
+              <a:t>4/27/2013</a:t>
             </a:fld>
             <a:endParaRPr lang="en-US" dirty="0"/>
           </a:p>
@@ -3343,7 +3343,7 @@
             <a:fld id="{B333081E-CB5B-4882-B306-CC37CE1A7762}" type="datetimeFigureOut">
               <a:rPr lang="en-US" smtClean="0"/>
               <a:pPr/>
-              <a:t>4/26/2013</a:t>
+              <a:t>4/27/2013</a:t>
             </a:fld>
             <a:endParaRPr lang="en-US" dirty="0"/>
           </a:p>
@@ -3510,7 +3510,7 @@
             <a:fld id="{B333081E-CB5B-4882-B306-CC37CE1A7762}" type="datetimeFigureOut">
               <a:rPr lang="en-US" smtClean="0"/>
               <a:pPr/>
-              <a:t>4/26/2013</a:t>
+              <a:t>4/27/2013</a:t>
             </a:fld>
             <a:endParaRPr lang="en-US" dirty="0"/>
           </a:p>
@@ -3753,7 +3753,7 @@
             <a:fld id="{B333081E-CB5B-4882-B306-CC37CE1A7762}" type="datetimeFigureOut">
               <a:rPr lang="en-US" smtClean="0"/>
               <a:pPr/>
-              <a:t>4/26/2013</a:t>
+              <a:t>4/27/2013</a:t>
             </a:fld>
             <a:endParaRPr lang="en-US" dirty="0"/>
           </a:p>
@@ -3868,7 +3868,7 @@
             <a:fld id="{B333081E-CB5B-4882-B306-CC37CE1A7762}" type="datetimeFigureOut">
               <a:rPr lang="en-US" smtClean="0"/>
               <a:pPr/>
-              <a:t>4/26/2013</a:t>
+              <a:t>4/27/2013</a:t>
             </a:fld>
             <a:endParaRPr lang="en-US" dirty="0"/>
           </a:p>
@@ -4409,7 +4409,7 @@
             <a:fld id="{B333081E-CB5B-4882-B306-CC37CE1A7762}" type="datetimeFigureOut">
               <a:rPr lang="en-US" smtClean="0"/>
               <a:pPr/>
-              <a:t>4/26/2013</a:t>
+              <a:t>4/27/2013</a:t>
             </a:fld>
             <a:endParaRPr lang="en-US" dirty="0"/>
           </a:p>
@@ -4524,7 +4524,7 @@
             <a:fld id="{B333081E-CB5B-4882-B306-CC37CE1A7762}" type="datetimeFigureOut">
               <a:rPr lang="en-US" smtClean="0"/>
               <a:pPr/>
-              <a:t>4/26/2013</a:t>
+              <a:t>4/27/2013</a:t>
             </a:fld>
             <a:endParaRPr lang="en-US" dirty="0"/>
           </a:p>
@@ -4616,7 +4616,7 @@
             <a:fld id="{B333081E-CB5B-4882-B306-CC37CE1A7762}" type="datetimeFigureOut">
               <a:rPr lang="en-US" smtClean="0"/>
               <a:pPr/>
-              <a:t>4/26/2013</a:t>
+              <a:t>4/27/2013</a:t>
             </a:fld>
             <a:endParaRPr lang="en-US" dirty="0"/>
           </a:p>
@@ -7269,7 +7269,7 @@
             <a:fld id="{B333081E-CB5B-4882-B306-CC37CE1A7762}" type="datetimeFigureOut">
               <a:rPr lang="en-US" smtClean="0"/>
               <a:pPr/>
-              <a:t>4/26/2013</a:t>
+              <a:t>4/27/2013</a:t>
             </a:fld>
             <a:endParaRPr lang="en-US" dirty="0"/>
           </a:p>
@@ -10483,7 +10483,7 @@
             <a:fld id="{B333081E-CB5B-4882-B306-CC37CE1A7762}" type="datetimeFigureOut">
               <a:rPr lang="en-US" smtClean="0"/>
               <a:pPr/>
-              <a:t>4/26/2013</a:t>
+              <a:t>4/27/2013</a:t>
             </a:fld>
             <a:endParaRPr lang="en-US" dirty="0"/>
           </a:p>
@@ -13307,7 +13307,7 @@
             <a:fld id="{B333081E-CB5B-4882-B306-CC37CE1A7762}" type="datetimeFigureOut">
               <a:rPr lang="en-US" smtClean="0"/>
               <a:pPr/>
-              <a:t>4/26/2013</a:t>
+              <a:t>4/27/2013</a:t>
             </a:fld>
             <a:endParaRPr lang="en-US" dirty="0"/>
           </a:p>
@@ -13852,7 +13852,7 @@
     </p:spTree>
     <p:extLst>
       <p:ext uri="{BB962C8B-B14F-4D97-AF65-F5344CB8AC3E}">
-        <p14:creationId xmlns:p14="http://schemas.microsoft.com/office/powerpoint/2010/main" xmlns="" val="666355475"/>
+        <p14:creationId xmlns="" xmlns:p14="http://schemas.microsoft.com/office/powerpoint/2010/main" val="666355475"/>
       </p:ext>
     </p:extLst>
   </p:cSld>
@@ -13930,7 +13930,7 @@
           <a:blip r:embed="rId2" cstate="print">
             <a:extLst>
               <a:ext uri="{28A0092B-C50C-407E-A947-70E740481C1C}">
-                <a14:useLocalDpi xmlns:a14="http://schemas.microsoft.com/office/drawing/2010/main" xmlns="" val="0"/>
+                <a14:useLocalDpi xmlns="" xmlns:a14="http://schemas.microsoft.com/office/drawing/2010/main" val="0"/>
               </a:ext>
             </a:extLst>
           </a:blip>
@@ -13978,7 +13978,7 @@
     </p:spTree>
     <p:extLst>
       <p:ext uri="{BB962C8B-B14F-4D97-AF65-F5344CB8AC3E}">
-        <p14:creationId xmlns:p14="http://schemas.microsoft.com/office/powerpoint/2010/main" xmlns="" val="3699659208"/>
+        <p14:creationId xmlns="" xmlns:p14="http://schemas.microsoft.com/office/powerpoint/2010/main" val="3699659208"/>
       </p:ext>
     </p:extLst>
   </p:cSld>
@@ -14042,35 +14042,6 @@
           </a:p>
         </p:txBody>
       </p:sp>
-      <p:pic>
-        <p:nvPicPr>
-          <p:cNvPr id="4" name="Content Placeholder 3"/>
-          <p:cNvPicPr>
-            <a:picLocks noGrp="1" noChangeAspect="1"/>
-          </p:cNvPicPr>
-          <p:nvPr>
-            <p:ph idx="1"/>
-          </p:nvPr>
-        </p:nvPicPr>
-        <p:blipFill>
-          <a:blip r:embed="rId2" cstate="print">
-            <a:extLst>
-              <a:ext uri="{28A0092B-C50C-407E-A947-70E740481C1C}">
-                <a14:useLocalDpi xmlns:a14="http://schemas.microsoft.com/office/drawing/2010/main" xmlns="" val="0"/>
-              </a:ext>
-            </a:extLst>
-          </a:blip>
-          <a:stretch>
-            <a:fillRect/>
-          </a:stretch>
-        </p:blipFill>
-        <p:spPr>
-          <a:xfrm>
-            <a:off x="1828800" y="1434008"/>
-            <a:ext cx="5943600" cy="4940847"/>
-          </a:xfrm>
-        </p:spPr>
-      </p:pic>
       <p:sp>
         <p:nvSpPr>
           <p:cNvPr id="6" name="TextBox 5"/>
@@ -14101,10 +14072,33 @@
           </a:p>
         </p:txBody>
       </p:sp>
+      <p:pic>
+        <p:nvPicPr>
+          <p:cNvPr id="7" name="Content Placeholder 6" descr="texturing an object.png"/>
+          <p:cNvPicPr>
+            <a:picLocks noGrp="1" noChangeAspect="1"/>
+          </p:cNvPicPr>
+          <p:nvPr>
+            <p:ph idx="1"/>
+          </p:nvPr>
+        </p:nvPicPr>
+        <p:blipFill>
+          <a:blip r:embed="rId2" cstate="print"/>
+          <a:stretch>
+            <a:fillRect/>
+          </a:stretch>
+        </p:blipFill>
+        <p:spPr>
+          <a:xfrm>
+            <a:off x="1066800" y="1676400"/>
+            <a:ext cx="7162800" cy="4156075"/>
+          </a:xfrm>
+        </p:spPr>
+      </p:pic>
     </p:spTree>
     <p:extLst>
       <p:ext uri="{BB962C8B-B14F-4D97-AF65-F5344CB8AC3E}">
-        <p14:creationId xmlns:p14="http://schemas.microsoft.com/office/powerpoint/2010/main" xmlns="" val="2213963016"/>
+        <p14:creationId xmlns="" xmlns:p14="http://schemas.microsoft.com/office/powerpoint/2010/main" val="2213963016"/>
       </p:ext>
     </p:extLst>
   </p:cSld>
@@ -14212,7 +14206,7 @@
           <a:blip r:embed="rId2" cstate="print">
             <a:extLst>
               <a:ext uri="{28A0092B-C50C-407E-A947-70E740481C1C}">
-                <a14:useLocalDpi xmlns:a14="http://schemas.microsoft.com/office/drawing/2010/main" xmlns="" val="0"/>
+                <a14:useLocalDpi xmlns="" xmlns:a14="http://schemas.microsoft.com/office/drawing/2010/main" val="0"/>
               </a:ext>
             </a:extLst>
           </a:blip>
@@ -14230,7 +14224,7 @@
     </p:spTree>
     <p:extLst>
       <p:ext uri="{BB962C8B-B14F-4D97-AF65-F5344CB8AC3E}">
-        <p14:creationId xmlns:p14="http://schemas.microsoft.com/office/powerpoint/2010/main" xmlns="" val="597527647"/>
+        <p14:creationId xmlns="" xmlns:p14="http://schemas.microsoft.com/office/powerpoint/2010/main" val="597527647"/>
       </p:ext>
     </p:extLst>
   </p:cSld>
@@ -14374,7 +14368,7 @@
     </p:spTree>
     <p:extLst>
       <p:ext uri="{BB962C8B-B14F-4D97-AF65-F5344CB8AC3E}">
-        <p14:creationId xmlns:p14="http://schemas.microsoft.com/office/powerpoint/2010/main" xmlns="" val="14587613"/>
+        <p14:creationId xmlns="" xmlns:p14="http://schemas.microsoft.com/office/powerpoint/2010/main" val="14587613"/>
       </p:ext>
     </p:extLst>
   </p:cSld>
@@ -14504,7 +14498,7 @@
     </p:spTree>
     <p:extLst>
       <p:ext uri="{BB962C8B-B14F-4D97-AF65-F5344CB8AC3E}">
-        <p14:creationId xmlns:p14="http://schemas.microsoft.com/office/powerpoint/2010/main" xmlns="" val="1200128816"/>
+        <p14:creationId xmlns="" xmlns:p14="http://schemas.microsoft.com/office/powerpoint/2010/main" val="1200128816"/>
       </p:ext>
     </p:extLst>
   </p:cSld>
@@ -14608,7 +14602,7 @@
     </p:spTree>
     <p:extLst>
       <p:ext uri="{BB962C8B-B14F-4D97-AF65-F5344CB8AC3E}">
-        <p14:creationId xmlns:p14="http://schemas.microsoft.com/office/powerpoint/2010/main" xmlns="" val="435183730"/>
+        <p14:creationId xmlns="" xmlns:p14="http://schemas.microsoft.com/office/powerpoint/2010/main" val="435183730"/>
       </p:ext>
     </p:extLst>
   </p:cSld>
@@ -14746,7 +14740,7 @@
     </p:spTree>
     <p:extLst>
       <p:ext uri="{BB962C8B-B14F-4D97-AF65-F5344CB8AC3E}">
-        <p14:creationId xmlns:p14="http://schemas.microsoft.com/office/powerpoint/2010/main" xmlns="" val="429522322"/>
+        <p14:creationId xmlns="" xmlns:p14="http://schemas.microsoft.com/office/powerpoint/2010/main" val="429522322"/>
       </p:ext>
     </p:extLst>
   </p:cSld>
@@ -14820,13 +14814,8 @@
           <a:p>
             <a:r>
               <a:rPr lang="en-US" dirty="0" smtClean="0"/>
-              <a:t>Menu </a:t>
-            </a:r>
-            <a:r>
-              <a:rPr lang="en-US" dirty="0" smtClean="0"/>
-              <a:t>display (software interface)</a:t>
-            </a:r>
-            <a:endParaRPr lang="en-US" dirty="0" smtClean="0"/>
+              <a:t>Menu display (software interface)</a:t>
+            </a:r>
           </a:p>
           <a:p>
             <a:r>
@@ -14839,48 +14828,39 @@
             </a:r>
             <a:r>
               <a:rPr lang="en-US" dirty="0" smtClean="0"/>
-              <a:t> remotes)</a:t>
-            </a:r>
-          </a:p>
-          <a:p>
+              <a:t> </a:t>
+            </a:r>
             <a:r>
               <a:rPr lang="en-US" dirty="0" smtClean="0"/>
-              <a:t>Number of manipulation allowed on </a:t>
+              <a:t>remotes </a:t>
             </a:r>
             <a:r>
               <a:rPr lang="en-US" dirty="0" smtClean="0"/>
-              <a:t>an object (</a:t>
+              <a:t>Virtual Hand Casting</a:t>
             </a:r>
             <a:r>
               <a:rPr lang="en-US" dirty="0" smtClean="0"/>
-              <a:t>low level </a:t>
-            </a:r>
+              <a:t>)</a:t>
+            </a:r>
+            <a:endParaRPr lang="en-US" dirty="0" smtClean="0"/>
+          </a:p>
+          <a:p>
             <a:r>
               <a:rPr lang="en-US" dirty="0" smtClean="0"/>
-              <a:t>correction and </a:t>
-            </a:r>
+              <a:t>Number of manipulation allowed on an object (low level correction and revision)</a:t>
+            </a:r>
+          </a:p>
+          <a:p>
             <a:r>
               <a:rPr lang="en-US" dirty="0" smtClean="0"/>
-              <a:t>revision)</a:t>
-            </a:r>
-            <a:endParaRPr lang="en-US" dirty="0" smtClean="0"/>
+              <a:t>Scale the world</a:t>
+            </a:r>
           </a:p>
           <a:p>
             <a:r>
               <a:rPr lang="en-US" dirty="0" smtClean="0"/>
-              <a:t>Scale the </a:t>
-            </a:r>
-            <a:r>
-              <a:rPr lang="en-US" dirty="0" smtClean="0"/>
-              <a:t>world</a:t>
-            </a:r>
-          </a:p>
-          <a:p>
-            <a:r>
-              <a:rPr lang="en-US" smtClean="0"/>
               <a:t>Bird-eye view</a:t>
             </a:r>
-            <a:endParaRPr lang="en-US" dirty="0" smtClean="0"/>
           </a:p>
           <a:p>
             <a:endParaRPr lang="en-US" dirty="0"/>
@@ -14890,7 +14870,7 @@
     </p:spTree>
     <p:extLst>
       <p:ext uri="{BB962C8B-B14F-4D97-AF65-F5344CB8AC3E}">
-        <p14:creationId xmlns:p14="http://schemas.microsoft.com/office/powerpoint/2010/main" xmlns="" val="193691291"/>
+        <p14:creationId xmlns="" xmlns:p14="http://schemas.microsoft.com/office/powerpoint/2010/main" val="193691291"/>
       </p:ext>
     </p:extLst>
   </p:cSld>
@@ -14996,7 +14976,7 @@
     </p:spTree>
     <p:extLst>
       <p:ext uri="{BB962C8B-B14F-4D97-AF65-F5344CB8AC3E}">
-        <p14:creationId xmlns:p14="http://schemas.microsoft.com/office/powerpoint/2010/main" xmlns="" val="1634110124"/>
+        <p14:creationId xmlns="" xmlns:p14="http://schemas.microsoft.com/office/powerpoint/2010/main" val="1634110124"/>
       </p:ext>
     </p:extLst>
   </p:cSld>
@@ -15116,7 +15096,7 @@
     </p:spTree>
     <p:extLst>
       <p:ext uri="{BB962C8B-B14F-4D97-AF65-F5344CB8AC3E}">
-        <p14:creationId xmlns:p14="http://schemas.microsoft.com/office/powerpoint/2010/main" xmlns="" val="2771204190"/>
+        <p14:creationId xmlns="" xmlns:p14="http://schemas.microsoft.com/office/powerpoint/2010/main" val="2771204190"/>
       </p:ext>
     </p:extLst>
   </p:cSld>
@@ -15264,7 +15244,7 @@
     </p:spTree>
     <p:extLst>
       <p:ext uri="{BB962C8B-B14F-4D97-AF65-F5344CB8AC3E}">
-        <p14:creationId xmlns:p14="http://schemas.microsoft.com/office/powerpoint/2010/main" xmlns="" val="3358130738"/>
+        <p14:creationId xmlns="" xmlns:p14="http://schemas.microsoft.com/office/powerpoint/2010/main" val="3358130738"/>
       </p:ext>
     </p:extLst>
   </p:cSld>
@@ -15368,7 +15348,7 @@
     </p:spTree>
     <p:extLst>
       <p:ext uri="{BB962C8B-B14F-4D97-AF65-F5344CB8AC3E}">
-        <p14:creationId xmlns:p14="http://schemas.microsoft.com/office/powerpoint/2010/main" xmlns="" val="945286241"/>
+        <p14:creationId xmlns="" xmlns:p14="http://schemas.microsoft.com/office/powerpoint/2010/main" val="945286241"/>
       </p:ext>
     </p:extLst>
   </p:cSld>
@@ -15531,7 +15511,7 @@
     </p:spTree>
     <p:extLst>
       <p:ext uri="{BB962C8B-B14F-4D97-AF65-F5344CB8AC3E}">
-        <p14:creationId xmlns:p14="http://schemas.microsoft.com/office/powerpoint/2010/main" xmlns="" val="3205191440"/>
+        <p14:creationId xmlns="" xmlns:p14="http://schemas.microsoft.com/office/powerpoint/2010/main" val="3205191440"/>
       </p:ext>
     </p:extLst>
   </p:cSld>
@@ -15609,7 +15589,7 @@
           <a:blip r:embed="rId2" cstate="print">
             <a:extLst>
               <a:ext uri="{28A0092B-C50C-407E-A947-70E740481C1C}">
-                <a14:useLocalDpi xmlns:a14="http://schemas.microsoft.com/office/drawing/2010/main" xmlns="" val="0"/>
+                <a14:useLocalDpi xmlns="" xmlns:a14="http://schemas.microsoft.com/office/drawing/2010/main" val="0"/>
               </a:ext>
             </a:extLst>
           </a:blip>
@@ -15657,7 +15637,7 @@
     </p:spTree>
     <p:extLst>
       <p:ext uri="{BB962C8B-B14F-4D97-AF65-F5344CB8AC3E}">
-        <p14:creationId xmlns:p14="http://schemas.microsoft.com/office/powerpoint/2010/main" xmlns="" val="2917243991"/>
+        <p14:creationId xmlns="" xmlns:p14="http://schemas.microsoft.com/office/powerpoint/2010/main" val="2917243991"/>
       </p:ext>
     </p:extLst>
   </p:cSld>

</xml_diff>